<commit_message>
splash screen for 3.01
</commit_message>
<xml_diff>
--- a/interprologForJDK/src/com/coherentknowledge/fidji/splash-screens.pptx
+++ b/interprologForJDK/src/com/coherentknowledge/fidji/splash-screens.pptx
@@ -5,16 +5,17 @@
     <p:sldMasterId id="2147483648" r:id="rId1"/>
   </p:sldMasterIdLst>
   <p:notesMasterIdLst>
-    <p:notesMasterId r:id="rId9"/>
+    <p:notesMasterId r:id="rId10"/>
   </p:notesMasterIdLst>
   <p:sldIdLst>
     <p:sldId id="256" r:id="rId2"/>
     <p:sldId id="266" r:id="rId3"/>
-    <p:sldId id="271" r:id="rId4"/>
-    <p:sldId id="269" r:id="rId5"/>
-    <p:sldId id="268" r:id="rId6"/>
-    <p:sldId id="264" r:id="rId7"/>
-    <p:sldId id="270" r:id="rId8"/>
+    <p:sldId id="272" r:id="rId4"/>
+    <p:sldId id="271" r:id="rId5"/>
+    <p:sldId id="269" r:id="rId6"/>
+    <p:sldId id="268" r:id="rId7"/>
+    <p:sldId id="264" r:id="rId8"/>
+    <p:sldId id="270" r:id="rId9"/>
   </p:sldIdLst>
   <p:sldSz cx="6765925" cy="1646238"/>
   <p:notesSz cx="6858000" cy="9144000"/>
@@ -115,7 +116,7 @@
   </p:defaultTextStyle>
   <p:extLst>
     <p:ext uri="{EFAFB233-063F-42B5-8137-9DF3F51BA10A}">
-      <p15:sldGuideLst xmlns="" xmlns:p15="http://schemas.microsoft.com/office/powerpoint/2012/main">
+      <p15:sldGuideLst xmlns:p15="http://schemas.microsoft.com/office/powerpoint/2012/main">
         <p15:guide id="1" orient="horz" pos="519">
           <p15:clr>
             <a:srgbClr val="A4A3A4"/>
@@ -136,10 +137,55 @@
 <p1510:revInfo xmlns:a="http://schemas.openxmlformats.org/drawingml/2006/main" xmlns:r="http://schemas.openxmlformats.org/officeDocument/2006/relationships" xmlns:p1510="http://schemas.microsoft.com/office/powerpoint/2015/10/main">
   <p1510:revLst>
     <p1510:client id="{03EC7BEB-B199-170E-5DB3-FD47C1AA5A2A}" v="8" dt="2020-03-18T02:03:21.051"/>
+    <p1510:client id="{05B3A866-9FA5-9013-9580-B827353487A5}" v="68" dt="2023-09-29T01:41:30.708"/>
     <p1510:client id="{5ECE7B2F-04CF-B24E-AF79-E228203CBCCC}" v="13" dt="2020-11-15T06:52:01.760"/>
     <p1510:client id="{C5AFA037-0E39-6215-B339-D47804393005}" v="6" dt="2020-11-15T06:40:00.687"/>
   </p1510:revLst>
 </p1510:revInfo>
+</file>
+
+<file path=ppt/changesInfos/changesInfo1.xml><?xml version="1.0" encoding="utf-8"?>
+<pc:chgInfo xmlns:a="http://schemas.openxmlformats.org/drawingml/2006/main" xmlns:r="http://schemas.openxmlformats.org/officeDocument/2006/relationships" xmlns:ac="http://schemas.microsoft.com/office/drawing/2013/main/command" xmlns:pc="http://schemas.microsoft.com/office/powerpoint/2013/main/command">
+  <pc:docChgLst>
+    <pc:chgData name="Michael Kifer" userId="S::michael.kifer@stonybrook.edu::ca4e4cc4-8ef7-4404-ba0b-d81b97d66a00" providerId="AD" clId="Web-{05B3A866-9FA5-9013-9580-B827353487A5}"/>
+    <pc:docChg chg="addSld modSld">
+      <pc:chgData name="Michael Kifer" userId="S::michael.kifer@stonybrook.edu::ca4e4cc4-8ef7-4404-ba0b-d81b97d66a00" providerId="AD" clId="Web-{05B3A866-9FA5-9013-9580-B827353487A5}" dt="2023-09-29T01:41:30.708" v="45" actId="20577"/>
+      <pc:docMkLst>
+        <pc:docMk/>
+      </pc:docMkLst>
+      <pc:sldChg chg="modSp">
+        <pc:chgData name="Michael Kifer" userId="S::michael.kifer@stonybrook.edu::ca4e4cc4-8ef7-4404-ba0b-d81b97d66a00" providerId="AD" clId="Web-{05B3A866-9FA5-9013-9580-B827353487A5}" dt="2023-09-29T01:41:30.708" v="45" actId="20577"/>
+        <pc:sldMkLst>
+          <pc:docMk/>
+          <pc:sldMk cId="91026351" sldId="266"/>
+        </pc:sldMkLst>
+        <pc:spChg chg="mod">
+          <ac:chgData name="Michael Kifer" userId="S::michael.kifer@stonybrook.edu::ca4e4cc4-8ef7-4404-ba0b-d81b97d66a00" providerId="AD" clId="Web-{05B3A866-9FA5-9013-9580-B827353487A5}" dt="2023-09-29T01:40:58.364" v="42" actId="20577"/>
+          <ac:spMkLst>
+            <pc:docMk/>
+            <pc:sldMk cId="91026351" sldId="266"/>
+            <ac:spMk id="6" creationId="{00000000-0000-0000-0000-000000000000}"/>
+          </ac:spMkLst>
+        </pc:spChg>
+        <pc:spChg chg="mod">
+          <ac:chgData name="Michael Kifer" userId="S::michael.kifer@stonybrook.edu::ca4e4cc4-8ef7-4404-ba0b-d81b97d66a00" providerId="AD" clId="Web-{05B3A866-9FA5-9013-9580-B827353487A5}" dt="2023-09-29T01:41:30.708" v="45" actId="20577"/>
+          <ac:spMkLst>
+            <pc:docMk/>
+            <pc:sldMk cId="91026351" sldId="266"/>
+            <ac:spMk id="10" creationId="{00000000-0000-0000-0000-000000000000}"/>
+          </ac:spMkLst>
+        </pc:spChg>
+      </pc:sldChg>
+      <pc:sldChg chg="add replId">
+        <pc:chgData name="Michael Kifer" userId="S::michael.kifer@stonybrook.edu::ca4e4cc4-8ef7-4404-ba0b-d81b97d66a00" providerId="AD" clId="Web-{05B3A866-9FA5-9013-9580-B827353487A5}" dt="2023-09-29T01:34:03.711" v="0"/>
+        <pc:sldMkLst>
+          <pc:docMk/>
+          <pc:sldMk cId="81185227" sldId="272"/>
+        </pc:sldMkLst>
+      </pc:sldChg>
+    </pc:docChg>
+  </pc:docChgLst>
+</pc:chgInfo>
 </file>
 
 <file path=ppt/notesMasters/notesMaster1.xml><?xml version="1.0" encoding="utf-8"?>
@@ -225,7 +271,7 @@
             <a:fld id="{6A2A9E75-4EEF-4611-BEFE-5982844DA06A}" type="datetimeFigureOut">
               <a:rPr lang="en-US" smtClean="0"/>
               <a:pPr/>
-              <a:t>2/21/2023</a:t>
+              <a:t>9/28/2023</a:t>
             </a:fld>
             <a:endParaRPr lang="en-US"/>
           </a:p>
@@ -393,7 +439,7 @@
     </p:spTree>
     <p:extLst>
       <p:ext uri="{BB962C8B-B14F-4D97-AF65-F5344CB8AC3E}">
-        <p14:creationId xmlns="" xmlns:p14="http://schemas.microsoft.com/office/powerpoint/2010/main" val="383450007"/>
+        <p14:creationId xmlns:p14="http://schemas.microsoft.com/office/powerpoint/2010/main" val="383450007"/>
       </p:ext>
     </p:extLst>
   </p:cSld>
@@ -543,12 +589,8 @@
           <a:lstStyle/>
           <a:p>
             <a:r>
-              <a:rPr lang="en-US" dirty="0"/>
-              <a:t>To change the size of the page go to Design, </a:t>
-            </a:r>
-            <a:r>
-              <a:rPr lang="en-US"/>
-              <a:t>Page Layout.</a:t>
+              <a:rPr lang="en-US"/>
+              <a:t>To change the size of the page go to Design, Page Layout.</a:t>
             </a:r>
           </a:p>
         </p:txBody>
@@ -580,7 +622,7 @@
     </p:spTree>
     <p:extLst>
       <p:ext uri="{BB962C8B-B14F-4D97-AF65-F5344CB8AC3E}">
-        <p14:creationId xmlns="" xmlns:p14="http://schemas.microsoft.com/office/powerpoint/2010/main" val="3800903868"/>
+        <p14:creationId xmlns:p14="http://schemas.microsoft.com/office/powerpoint/2010/main" val="3800903868"/>
       </p:ext>
     </p:extLst>
   </p:cSld>
@@ -640,12 +682,8 @@
           <a:lstStyle/>
           <a:p>
             <a:r>
-              <a:rPr lang="en-US" dirty="0"/>
-              <a:t>To change the size of the page go to Design, </a:t>
-            </a:r>
-            <a:r>
-              <a:rPr lang="en-US"/>
-              <a:t>Page Layout.</a:t>
+              <a:rPr lang="en-US"/>
+              <a:t>To change the size of the page go to Design, Page Layout.</a:t>
             </a:r>
           </a:p>
         </p:txBody>
@@ -677,7 +715,7 @@
     </p:spTree>
     <p:extLst>
       <p:ext uri="{BB962C8B-B14F-4D97-AF65-F5344CB8AC3E}">
-        <p14:creationId xmlns="" xmlns:p14="http://schemas.microsoft.com/office/powerpoint/2010/main" val="3800903868"/>
+        <p14:creationId xmlns:p14="http://schemas.microsoft.com/office/powerpoint/2010/main" val="3125553193"/>
       </p:ext>
     </p:extLst>
   </p:cSld>
@@ -737,12 +775,8 @@
           <a:lstStyle/>
           <a:p>
             <a:r>
-              <a:rPr lang="en-US" dirty="0"/>
-              <a:t>To change the size of the page go to Design, </a:t>
-            </a:r>
-            <a:r>
-              <a:rPr lang="en-US"/>
-              <a:t>Page Layout.</a:t>
+              <a:rPr lang="en-US"/>
+              <a:t>To change the size of the page go to Design, Page Layout.</a:t>
             </a:r>
           </a:p>
         </p:txBody>
@@ -774,7 +808,7 @@
     </p:spTree>
     <p:extLst>
       <p:ext uri="{BB962C8B-B14F-4D97-AF65-F5344CB8AC3E}">
-        <p14:creationId xmlns="" xmlns:p14="http://schemas.microsoft.com/office/powerpoint/2010/main" val="3800903868"/>
+        <p14:creationId xmlns:p14="http://schemas.microsoft.com/office/powerpoint/2010/main" val="3800903868"/>
       </p:ext>
     </p:extLst>
   </p:cSld>
@@ -834,12 +868,8 @@
           <a:lstStyle/>
           <a:p>
             <a:r>
-              <a:rPr lang="en-US" dirty="0"/>
-              <a:t>To change the size of the page go to Design, </a:t>
-            </a:r>
-            <a:r>
-              <a:rPr lang="en-US"/>
-              <a:t>Page Layout.</a:t>
+              <a:rPr lang="en-US"/>
+              <a:t>To change the size of the page go to Design, Page Layout.</a:t>
             </a:r>
           </a:p>
         </p:txBody>
@@ -871,7 +901,7 @@
     </p:spTree>
     <p:extLst>
       <p:ext uri="{BB962C8B-B14F-4D97-AF65-F5344CB8AC3E}">
-        <p14:creationId xmlns="" xmlns:p14="http://schemas.microsoft.com/office/powerpoint/2010/main" val="3800903868"/>
+        <p14:creationId xmlns:p14="http://schemas.microsoft.com/office/powerpoint/2010/main" val="3800903868"/>
       </p:ext>
     </p:extLst>
   </p:cSld>
@@ -931,12 +961,8 @@
           <a:lstStyle/>
           <a:p>
             <a:r>
-              <a:rPr lang="en-US" dirty="0"/>
-              <a:t>To change the size of the page go to Design, </a:t>
-            </a:r>
-            <a:r>
-              <a:rPr lang="en-US"/>
-              <a:t>Page Layout.</a:t>
+              <a:rPr lang="en-US"/>
+              <a:t>To change the size of the page go to Design, Page Layout.</a:t>
             </a:r>
           </a:p>
         </p:txBody>
@@ -968,7 +994,7 @@
     </p:spTree>
     <p:extLst>
       <p:ext uri="{BB962C8B-B14F-4D97-AF65-F5344CB8AC3E}">
-        <p14:creationId xmlns="" xmlns:p14="http://schemas.microsoft.com/office/powerpoint/2010/main" val="3800903868"/>
+        <p14:creationId xmlns:p14="http://schemas.microsoft.com/office/powerpoint/2010/main" val="3800903868"/>
       </p:ext>
     </p:extLst>
   </p:cSld>
@@ -1028,12 +1054,8 @@
           <a:lstStyle/>
           <a:p>
             <a:r>
-              <a:rPr lang="en-US" dirty="0"/>
-              <a:t>To change the size of the page go to Design, </a:t>
-            </a:r>
-            <a:r>
-              <a:rPr lang="en-US"/>
-              <a:t>Page Layout.</a:t>
+              <a:rPr lang="en-US"/>
+              <a:t>To change the size of the page go to Design, Page Layout.</a:t>
             </a:r>
           </a:p>
         </p:txBody>
@@ -1065,7 +1087,100 @@
     </p:spTree>
     <p:extLst>
       <p:ext uri="{BB962C8B-B14F-4D97-AF65-F5344CB8AC3E}">
-        <p14:creationId xmlns="" xmlns:p14="http://schemas.microsoft.com/office/powerpoint/2010/main" val="3800903868"/>
+        <p14:creationId xmlns:p14="http://schemas.microsoft.com/office/powerpoint/2010/main" val="3800903868"/>
+      </p:ext>
+    </p:extLst>
+  </p:cSld>
+  <p:clrMapOvr>
+    <a:masterClrMapping/>
+  </p:clrMapOvr>
+</p:notes>
+</file>
+
+<file path=ppt/notesSlides/notesSlide7.xml><?xml version="1.0" encoding="utf-8"?>
+<p:notes xmlns:a="http://schemas.openxmlformats.org/drawingml/2006/main" xmlns:r="http://schemas.openxmlformats.org/officeDocument/2006/relationships" xmlns:p="http://schemas.openxmlformats.org/presentationml/2006/main">
+  <p:cSld>
+    <p:spTree>
+      <p:nvGrpSpPr>
+        <p:cNvPr id="1" name=""/>
+        <p:cNvGrpSpPr/>
+        <p:nvPr/>
+      </p:nvGrpSpPr>
+      <p:grpSpPr>
+        <a:xfrm>
+          <a:off x="0" y="0"/>
+          <a:ext cx="0" cy="0"/>
+          <a:chOff x="0" y="0"/>
+          <a:chExt cx="0" cy="0"/>
+        </a:xfrm>
+      </p:grpSpPr>
+      <p:sp>
+        <p:nvSpPr>
+          <p:cNvPr id="2" name="Slide Image Placeholder 1"/>
+          <p:cNvSpPr>
+            <a:spLocks noGrp="1" noRot="1" noChangeAspect="1"/>
+          </p:cNvSpPr>
+          <p:nvPr>
+            <p:ph type="sldImg"/>
+          </p:nvPr>
+        </p:nvSpPr>
+        <p:spPr>
+          <a:xfrm>
+            <a:off x="-3617913" y="685800"/>
+            <a:ext cx="14093826" cy="3429000"/>
+          </a:xfrm>
+        </p:spPr>
+      </p:sp>
+      <p:sp>
+        <p:nvSpPr>
+          <p:cNvPr id="3" name="Notes Placeholder 2"/>
+          <p:cNvSpPr>
+            <a:spLocks noGrp="1"/>
+          </p:cNvSpPr>
+          <p:nvPr>
+            <p:ph type="body" idx="1"/>
+          </p:nvPr>
+        </p:nvSpPr>
+        <p:spPr/>
+        <p:txBody>
+          <a:bodyPr/>
+          <a:lstStyle/>
+          <a:p>
+            <a:r>
+              <a:rPr lang="en-US"/>
+              <a:t>To change the size of the page go to Design, Page Layout.</a:t>
+            </a:r>
+          </a:p>
+        </p:txBody>
+      </p:sp>
+      <p:sp>
+        <p:nvSpPr>
+          <p:cNvPr id="4" name="Slide Number Placeholder 3"/>
+          <p:cNvSpPr>
+            <a:spLocks noGrp="1"/>
+          </p:cNvSpPr>
+          <p:nvPr>
+            <p:ph type="sldNum" sz="quarter" idx="10"/>
+          </p:nvPr>
+        </p:nvSpPr>
+        <p:spPr/>
+        <p:txBody>
+          <a:bodyPr/>
+          <a:lstStyle/>
+          <a:p>
+            <a:fld id="{0436CF88-2934-4B73-A8FC-17EFB4C8A430}" type="slidenum">
+              <a:rPr lang="en-US" smtClean="0"/>
+              <a:pPr/>
+              <a:t>8</a:t>
+            </a:fld>
+            <a:endParaRPr lang="en-US"/>
+          </a:p>
+        </p:txBody>
+      </p:sp>
+    </p:spTree>
+    <p:extLst>
+      <p:ext uri="{BB962C8B-B14F-4D97-AF65-F5344CB8AC3E}">
+        <p14:creationId xmlns:p14="http://schemas.microsoft.com/office/powerpoint/2010/main" val="3800903868"/>
       </p:ext>
     </p:extLst>
   </p:cSld>
@@ -1255,7 +1370,7 @@
             <a:fld id="{8F8DA232-4CAA-4F42-B648-E3DD7E57C3AB}" type="datetimeFigureOut">
               <a:rPr lang="en-US" smtClean="0"/>
               <a:pPr/>
-              <a:t>2/21/2023</a:t>
+              <a:t>9/28/2023</a:t>
             </a:fld>
             <a:endParaRPr lang="en-US"/>
           </a:p>
@@ -1307,7 +1422,7 @@
     </p:spTree>
     <p:extLst>
       <p:ext uri="{BB962C8B-B14F-4D97-AF65-F5344CB8AC3E}">
-        <p14:creationId xmlns="" xmlns:p14="http://schemas.microsoft.com/office/powerpoint/2010/main" val="552886446"/>
+        <p14:creationId xmlns:p14="http://schemas.microsoft.com/office/powerpoint/2010/main" val="552886446"/>
       </p:ext>
     </p:extLst>
   </p:cSld>
@@ -1425,7 +1540,7 @@
             <a:fld id="{8F8DA232-4CAA-4F42-B648-E3DD7E57C3AB}" type="datetimeFigureOut">
               <a:rPr lang="en-US" smtClean="0"/>
               <a:pPr/>
-              <a:t>2/21/2023</a:t>
+              <a:t>9/28/2023</a:t>
             </a:fld>
             <a:endParaRPr lang="en-US"/>
           </a:p>
@@ -1477,7 +1592,7 @@
     </p:spTree>
     <p:extLst>
       <p:ext uri="{BB962C8B-B14F-4D97-AF65-F5344CB8AC3E}">
-        <p14:creationId xmlns="" xmlns:p14="http://schemas.microsoft.com/office/powerpoint/2010/main" val="2175191781"/>
+        <p14:creationId xmlns:p14="http://schemas.microsoft.com/office/powerpoint/2010/main" val="2175191781"/>
       </p:ext>
     </p:extLst>
   </p:cSld>
@@ -1605,7 +1720,7 @@
             <a:fld id="{8F8DA232-4CAA-4F42-B648-E3DD7E57C3AB}" type="datetimeFigureOut">
               <a:rPr lang="en-US" smtClean="0"/>
               <a:pPr/>
-              <a:t>2/21/2023</a:t>
+              <a:t>9/28/2023</a:t>
             </a:fld>
             <a:endParaRPr lang="en-US"/>
           </a:p>
@@ -1657,7 +1772,7 @@
     </p:spTree>
     <p:extLst>
       <p:ext uri="{BB962C8B-B14F-4D97-AF65-F5344CB8AC3E}">
-        <p14:creationId xmlns="" xmlns:p14="http://schemas.microsoft.com/office/powerpoint/2010/main" val="2520258827"/>
+        <p14:creationId xmlns:p14="http://schemas.microsoft.com/office/powerpoint/2010/main" val="2520258827"/>
       </p:ext>
     </p:extLst>
   </p:cSld>
@@ -1775,7 +1890,7 @@
             <a:fld id="{8F8DA232-4CAA-4F42-B648-E3DD7E57C3AB}" type="datetimeFigureOut">
               <a:rPr lang="en-US" smtClean="0"/>
               <a:pPr/>
-              <a:t>2/21/2023</a:t>
+              <a:t>9/28/2023</a:t>
             </a:fld>
             <a:endParaRPr lang="en-US"/>
           </a:p>
@@ -1827,7 +1942,7 @@
     </p:spTree>
     <p:extLst>
       <p:ext uri="{BB962C8B-B14F-4D97-AF65-F5344CB8AC3E}">
-        <p14:creationId xmlns="" xmlns:p14="http://schemas.microsoft.com/office/powerpoint/2010/main" val="1575099824"/>
+        <p14:creationId xmlns:p14="http://schemas.microsoft.com/office/powerpoint/2010/main" val="1575099824"/>
       </p:ext>
     </p:extLst>
   </p:cSld>
@@ -2022,7 +2137,7 @@
             <a:fld id="{8F8DA232-4CAA-4F42-B648-E3DD7E57C3AB}" type="datetimeFigureOut">
               <a:rPr lang="en-US" smtClean="0"/>
               <a:pPr/>
-              <a:t>2/21/2023</a:t>
+              <a:t>9/28/2023</a:t>
             </a:fld>
             <a:endParaRPr lang="en-US"/>
           </a:p>
@@ -2074,7 +2189,7 @@
     </p:spTree>
     <p:extLst>
       <p:ext uri="{BB962C8B-B14F-4D97-AF65-F5344CB8AC3E}">
-        <p14:creationId xmlns="" xmlns:p14="http://schemas.microsoft.com/office/powerpoint/2010/main" val="2686639723"/>
+        <p14:creationId xmlns:p14="http://schemas.microsoft.com/office/powerpoint/2010/main" val="2686639723"/>
       </p:ext>
     </p:extLst>
   </p:cSld>
@@ -2309,7 +2424,7 @@
             <a:fld id="{8F8DA232-4CAA-4F42-B648-E3DD7E57C3AB}" type="datetimeFigureOut">
               <a:rPr lang="en-US" smtClean="0"/>
               <a:pPr/>
-              <a:t>2/21/2023</a:t>
+              <a:t>9/28/2023</a:t>
             </a:fld>
             <a:endParaRPr lang="en-US"/>
           </a:p>
@@ -2361,7 +2476,7 @@
     </p:spTree>
     <p:extLst>
       <p:ext uri="{BB962C8B-B14F-4D97-AF65-F5344CB8AC3E}">
-        <p14:creationId xmlns="" xmlns:p14="http://schemas.microsoft.com/office/powerpoint/2010/main" val="1588810717"/>
+        <p14:creationId xmlns:p14="http://schemas.microsoft.com/office/powerpoint/2010/main" val="1588810717"/>
       </p:ext>
     </p:extLst>
   </p:cSld>
@@ -2735,7 +2850,7 @@
             <a:fld id="{8F8DA232-4CAA-4F42-B648-E3DD7E57C3AB}" type="datetimeFigureOut">
               <a:rPr lang="en-US" smtClean="0"/>
               <a:pPr/>
-              <a:t>2/21/2023</a:t>
+              <a:t>9/28/2023</a:t>
             </a:fld>
             <a:endParaRPr lang="en-US"/>
           </a:p>
@@ -2787,7 +2902,7 @@
     </p:spTree>
     <p:extLst>
       <p:ext uri="{BB962C8B-B14F-4D97-AF65-F5344CB8AC3E}">
-        <p14:creationId xmlns="" xmlns:p14="http://schemas.microsoft.com/office/powerpoint/2010/main" val="3500156947"/>
+        <p14:creationId xmlns:p14="http://schemas.microsoft.com/office/powerpoint/2010/main" val="3500156947"/>
       </p:ext>
     </p:extLst>
   </p:cSld>
@@ -2854,7 +2969,7 @@
             <a:fld id="{8F8DA232-4CAA-4F42-B648-E3DD7E57C3AB}" type="datetimeFigureOut">
               <a:rPr lang="en-US" smtClean="0"/>
               <a:pPr/>
-              <a:t>2/21/2023</a:t>
+              <a:t>9/28/2023</a:t>
             </a:fld>
             <a:endParaRPr lang="en-US"/>
           </a:p>
@@ -2906,7 +3021,7 @@
     </p:spTree>
     <p:extLst>
       <p:ext uri="{BB962C8B-B14F-4D97-AF65-F5344CB8AC3E}">
-        <p14:creationId xmlns="" xmlns:p14="http://schemas.microsoft.com/office/powerpoint/2010/main" val="2860006935"/>
+        <p14:creationId xmlns:p14="http://schemas.microsoft.com/office/powerpoint/2010/main" val="2860006935"/>
       </p:ext>
     </p:extLst>
   </p:cSld>
@@ -2951,7 +3066,7 @@
             <a:fld id="{8F8DA232-4CAA-4F42-B648-E3DD7E57C3AB}" type="datetimeFigureOut">
               <a:rPr lang="en-US" smtClean="0"/>
               <a:pPr/>
-              <a:t>2/21/2023</a:t>
+              <a:t>9/28/2023</a:t>
             </a:fld>
             <a:endParaRPr lang="en-US"/>
           </a:p>
@@ -3003,7 +3118,7 @@
     </p:spTree>
     <p:extLst>
       <p:ext uri="{BB962C8B-B14F-4D97-AF65-F5344CB8AC3E}">
-        <p14:creationId xmlns="" xmlns:p14="http://schemas.microsoft.com/office/powerpoint/2010/main" val="4062476033"/>
+        <p14:creationId xmlns:p14="http://schemas.microsoft.com/office/powerpoint/2010/main" val="4062476033"/>
       </p:ext>
     </p:extLst>
   </p:cSld>
@@ -3228,7 +3343,7 @@
             <a:fld id="{8F8DA232-4CAA-4F42-B648-E3DD7E57C3AB}" type="datetimeFigureOut">
               <a:rPr lang="en-US" smtClean="0"/>
               <a:pPr/>
-              <a:t>2/21/2023</a:t>
+              <a:t>9/28/2023</a:t>
             </a:fld>
             <a:endParaRPr lang="en-US"/>
           </a:p>
@@ -3280,7 +3395,7 @@
     </p:spTree>
     <p:extLst>
       <p:ext uri="{BB962C8B-B14F-4D97-AF65-F5344CB8AC3E}">
-        <p14:creationId xmlns="" xmlns:p14="http://schemas.microsoft.com/office/powerpoint/2010/main" val="1547561455"/>
+        <p14:creationId xmlns:p14="http://schemas.microsoft.com/office/powerpoint/2010/main" val="1547561455"/>
       </p:ext>
     </p:extLst>
   </p:cSld>
@@ -3482,7 +3597,7 @@
             <a:fld id="{8F8DA232-4CAA-4F42-B648-E3DD7E57C3AB}" type="datetimeFigureOut">
               <a:rPr lang="en-US" smtClean="0"/>
               <a:pPr/>
-              <a:t>2/21/2023</a:t>
+              <a:t>9/28/2023</a:t>
             </a:fld>
             <a:endParaRPr lang="en-US"/>
           </a:p>
@@ -3534,7 +3649,7 @@
     </p:spTree>
     <p:extLst>
       <p:ext uri="{BB962C8B-B14F-4D97-AF65-F5344CB8AC3E}">
-        <p14:creationId xmlns="" xmlns:p14="http://schemas.microsoft.com/office/powerpoint/2010/main" val="2124133882"/>
+        <p14:creationId xmlns:p14="http://schemas.microsoft.com/office/powerpoint/2010/main" val="2124133882"/>
       </p:ext>
     </p:extLst>
   </p:cSld>
@@ -3695,7 +3810,7 @@
             <a:fld id="{8F8DA232-4CAA-4F42-B648-E3DD7E57C3AB}" type="datetimeFigureOut">
               <a:rPr lang="en-US" smtClean="0"/>
               <a:pPr/>
-              <a:t>2/21/2023</a:t>
+              <a:t>9/28/2023</a:t>
             </a:fld>
             <a:endParaRPr lang="en-US"/>
           </a:p>
@@ -3783,7 +3898,7 @@
     </p:spTree>
     <p:extLst>
       <p:ext uri="{BB962C8B-B14F-4D97-AF65-F5344CB8AC3E}">
-        <p14:creationId xmlns="" xmlns:p14="http://schemas.microsoft.com/office/powerpoint/2010/main" val="1300907545"/>
+        <p14:creationId xmlns:p14="http://schemas.microsoft.com/office/powerpoint/2010/main" val="1300907545"/>
       </p:ext>
     </p:extLst>
   </p:cSld>
@@ -4089,14 +4204,14 @@
           <a:lstStyle/>
           <a:p>
             <a:r>
-              <a:rPr lang="en-US" dirty="0"/>
+              <a:rPr lang="en-US"/>
               <a:t>Splash Screens for Ergo </a:t>
             </a:r>
             <a:r>
-              <a:rPr lang="en-US" dirty="0" err="1"/>
+              <a:rPr lang="en-US" err="1"/>
               <a:t>x.y</a:t>
             </a:r>
-            <a:endParaRPr lang="en-US" dirty="0" err="1">
+            <a:endParaRPr lang="en-US" err="1">
               <a:cs typeface="Calibri"/>
             </a:endParaRPr>
           </a:p>
@@ -4120,7 +4235,7 @@
           <a:lstStyle/>
           <a:p>
             <a:r>
-              <a:rPr lang="en-US" dirty="0"/>
+              <a:rPr lang="en-US"/>
               <a:t>Janine Bloomfield</a:t>
             </a:r>
           </a:p>
@@ -4129,7 +4244,7 @@
     </p:spTree>
     <p:extLst>
       <p:ext uri="{BB962C8B-B14F-4D97-AF65-F5344CB8AC3E}">
-        <p14:creationId xmlns="" xmlns:p14="http://schemas.microsoft.com/office/powerpoint/2010/main" val="2464956666"/>
+        <p14:creationId xmlns:p14="http://schemas.microsoft.com/office/powerpoint/2010/main" val="2464956666"/>
       </p:ext>
     </p:extLst>
   </p:cSld>
@@ -4249,7 +4364,7 @@
             <a:blip r:embed="rId3" cstate="email">
               <a:extLst>
                 <a:ext uri="{BEBA8EAE-BF5A-486C-A8C5-ECC9F3942E4B}">
-                  <a14:imgProps xmlns="" xmlns:a14="http://schemas.microsoft.com/office/drawing/2010/main">
+                  <a14:imgProps xmlns:a14="http://schemas.microsoft.com/office/drawing/2010/main">
                     <a14:imgLayer r:embed="rId4">
                       <a14:imgEffect>
                         <a14:artisticGlowDiffused/>
@@ -4258,7 +4373,7 @@
                   </a14:imgProps>
                 </a:ext>
                 <a:ext uri="{28A0092B-C50C-407E-A947-70E740481C1C}">
-                  <a14:useLocalDpi xmlns="" xmlns:a14="http://schemas.microsoft.com/office/drawing/2010/main"/>
+                  <a14:useLocalDpi xmlns:a14="http://schemas.microsoft.com/office/drawing/2010/main"/>
                 </a:ext>
               </a:extLst>
             </a:blip>
@@ -4284,7 +4399,7 @@
           <p:spPr>
             <a:xfrm>
               <a:off x="1695217" y="1963597"/>
-              <a:ext cx="6673276" cy="1068437"/>
+              <a:ext cx="6673276" cy="982960"/>
             </a:xfrm>
             <a:prstGeom prst="rect">
               <a:avLst/>
@@ -4292,71 +4407,83 @@
             <a:noFill/>
           </p:spPr>
           <p:txBody>
-            <a:bodyPr wrap="square" lIns="91422" tIns="45711" rIns="91422" bIns="45711" rtlCol="0">
+            <a:bodyPr wrap="square" lIns="91422" tIns="45711" rIns="91422" bIns="45711" rtlCol="0" anchor="t">
               <a:spAutoFit/>
             </a:bodyPr>
             <a:lstStyle/>
             <a:p>
               <a:r>
-                <a:rPr lang="en-US" sz="4400" dirty="0">
+                <a:rPr lang="en-US" sz="2000">
                   <a:solidFill>
                     <a:srgbClr val="0039AC"/>
                   </a:solidFill>
-                  <a:latin typeface="Lucida Handwriting" panose="03010101010101010101" pitchFamily="66" charset="0"/>
+                  <a:latin typeface="Lucida Handwriting"/>
                 </a:rPr>
-                <a:t> </a:t>
+                <a:t> </a:t>
               </a:r>
               <a:r>
-                <a:rPr lang="en-US" sz="4400">
+                <a:rPr lang="en-US" sz="4000">
                   <a:solidFill>
                     <a:srgbClr val="0039AC"/>
                   </a:solidFill>
-                  <a:latin typeface="Lucida Handwriting" panose="03010101010101010101" pitchFamily="66" charset="0"/>
+                  <a:latin typeface="Lucida Handwriting"/>
                 </a:rPr>
                 <a:t>E</a:t>
               </a:r>
               <a:r>
-                <a:rPr lang="en-US" sz="3400">
+                <a:rPr lang="en-US" sz="3200">
                   <a:solidFill>
                     <a:srgbClr val="0039AC"/>
                   </a:solidFill>
-                  <a:latin typeface="Lucida Handwriting" panose="03010101010101010101" pitchFamily="66" charset="0"/>
+                  <a:latin typeface="Lucida Handwriting"/>
                 </a:rPr>
                 <a:t>RGO</a:t>
               </a:r>
               <a:r>
-                <a:rPr lang="en-US" sz="4200">
+                <a:rPr lang="en-US" sz="3600">
                   <a:solidFill>
                     <a:srgbClr val="0039AC"/>
                   </a:solidFill>
-                  <a:latin typeface="Lucida Handwriting" panose="03010101010101010101" pitchFamily="66" charset="0"/>
+                  <a:latin typeface="Lucida Handwriting"/>
                 </a:rPr>
-                <a:t>AI </a:t>
+                <a:t>AI</a:t>
               </a:r>
               <a:r>
-                <a:rPr lang="en-US" sz="4200" smtClean="0">
+                <a:rPr lang="en-US" sz="2000">
                   <a:solidFill>
                     <a:srgbClr val="0039AC"/>
                   </a:solidFill>
-                  <a:latin typeface="Lucida Handwriting" panose="03010101010101010101" pitchFamily="66" charset="0"/>
+                  <a:latin typeface="Lucida Handwriting"/>
                 </a:rPr>
-                <a:t>3.0 </a:t>
+                <a:t> </a:t>
               </a:r>
               <a:r>
-                <a:rPr lang="en-US" sz="3000" dirty="0" smtClean="0">
+                <a:rPr lang="en-US" sz="3600">
                   <a:solidFill>
                     <a:srgbClr val="0039AC"/>
                   </a:solidFill>
-                  <a:latin typeface="Lucida Handwriting" panose="03010101010101010101" pitchFamily="66" charset="0"/>
+                  <a:latin typeface="Lucida Handwriting"/>
+                </a:rPr>
+                <a:t>3.01</a:t>
+              </a:r>
+              <a:r>
+                <a:rPr lang="en-US" sz="2800">
+                  <a:solidFill>
+                    <a:srgbClr val="0039AC"/>
+                  </a:solidFill>
+                  <a:latin typeface="Lucida Handwriting"/>
+                </a:rPr>
+                <a:t> </a:t>
+              </a:r>
+              <a:r>
+                <a:rPr lang="en-US" sz="3200">
+                  <a:solidFill>
+                    <a:srgbClr val="0039AC"/>
+                  </a:solidFill>
+                  <a:latin typeface="Lucida Handwriting"/>
                 </a:rPr>
                 <a:t>(Philo)</a:t>
               </a:r>
-              <a:endParaRPr lang="en-US" sz="3000" dirty="0">
-                <a:solidFill>
-                  <a:srgbClr val="0039AC"/>
-                </a:solidFill>
-                <a:latin typeface="Lucida Handwriting" panose="03010101010101010101" pitchFamily="66" charset="0"/>
-              </a:endParaRPr>
             </a:p>
           </p:txBody>
         </p:sp>
@@ -4382,36 +4509,12 @@
             <a:lstStyle/>
             <a:p>
               <a:r>
-                <a:rPr lang="en-US" sz="1100" dirty="0" smtClean="0">
+                <a:rPr lang="en-US" sz="1100">
                   <a:solidFill>
                     <a:srgbClr val="0039AC"/>
                   </a:solidFill>
                 </a:rPr>
-                <a:t>                      Copyright </a:t>
-              </a:r>
-              <a:r>
-                <a:rPr lang="en-US" sz="1100" dirty="0">
-                  <a:solidFill>
-                    <a:srgbClr val="0039AC"/>
-                  </a:solidFill>
-                </a:rPr>
-                <a:t>© Coherent Knowledge Systems, LLC. </a:t>
-              </a:r>
-              <a:r>
-                <a:rPr lang="en-US" sz="1100" smtClean="0">
-                  <a:solidFill>
-                    <a:srgbClr val="0039AC"/>
-                  </a:solidFill>
-                </a:rPr>
-                <a:t>2013-2023.</a:t>
-              </a:r>
-              <a:r>
-                <a:rPr lang="en-US" sz="1100" dirty="0">
-                  <a:solidFill>
-                    <a:srgbClr val="0039AC"/>
-                  </a:solidFill>
-                </a:rPr>
-                <a:t> </a:t>
+                <a:t>                      Copyright © Coherent Knowledge Systems, LLC. 2013-2024. </a:t>
               </a:r>
             </a:p>
           </p:txBody>
@@ -4431,7 +4534,7 @@
           <a:blip r:embed="rId6" cstate="print">
             <a:extLst>
               <a:ext uri="{28A0092B-C50C-407E-A947-70E740481C1C}">
-                <a14:useLocalDpi xmlns="" xmlns:a14="http://schemas.microsoft.com/office/drawing/2010/main" val="0"/>
+                <a14:useLocalDpi xmlns:a14="http://schemas.microsoft.com/office/drawing/2010/main" val="0"/>
               </a:ext>
             </a:extLst>
           </a:blip>
@@ -4452,7 +4555,7 @@
     </p:spTree>
     <p:extLst>
       <p:ext uri="{BB962C8B-B14F-4D97-AF65-F5344CB8AC3E}">
-        <p14:creationId xmlns="" xmlns:p14="http://schemas.microsoft.com/office/powerpoint/2010/main" val="91026351"/>
+        <p14:creationId xmlns:p14="http://schemas.microsoft.com/office/powerpoint/2010/main" val="91026351"/>
       </p:ext>
     </p:extLst>
   </p:cSld>
@@ -4572,7 +4675,7 @@
             <a:blip r:embed="rId3" cstate="email">
               <a:extLst>
                 <a:ext uri="{BEBA8EAE-BF5A-486C-A8C5-ECC9F3942E4B}">
-                  <a14:imgProps xmlns="" xmlns:a14="http://schemas.microsoft.com/office/drawing/2010/main">
+                  <a14:imgProps xmlns:a14="http://schemas.microsoft.com/office/drawing/2010/main">
                     <a14:imgLayer r:embed="rId4">
                       <a14:imgEffect>
                         <a14:artisticGlowDiffused/>
@@ -4581,7 +4684,7 @@
                   </a14:imgProps>
                 </a:ext>
                 <a:ext uri="{28A0092B-C50C-407E-A947-70E740481C1C}">
-                  <a14:useLocalDpi xmlns="" xmlns:a14="http://schemas.microsoft.com/office/drawing/2010/main"/>
+                  <a14:useLocalDpi xmlns:a14="http://schemas.microsoft.com/office/drawing/2010/main"/>
                 </a:ext>
               </a:extLst>
             </a:blip>
@@ -4621,22 +4724,13 @@
             <a:lstStyle/>
             <a:p>
               <a:r>
-                <a:rPr lang="en-US" sz="4400" dirty="0">
-                  <a:solidFill>
-                    <a:srgbClr val="0039AC"/>
-                  </a:solidFill>
-                  <a:latin typeface="Lucida Handwriting" panose="03010101010101010101" pitchFamily="66" charset="0"/>
-                </a:rPr>
-                <a:t> </a:t>
-              </a:r>
-              <a:r>
                 <a:rPr lang="en-US" sz="4400">
                   <a:solidFill>
                     <a:srgbClr val="0039AC"/>
                   </a:solidFill>
                   <a:latin typeface="Lucida Handwriting" panose="03010101010101010101" pitchFamily="66" charset="0"/>
                 </a:rPr>
-                <a:t>E</a:t>
+                <a:t> E</a:t>
               </a:r>
               <a:r>
                 <a:rPr lang="en-US" sz="3400">
@@ -4654,19 +4748,10 @@
                   </a:solidFill>
                   <a:latin typeface="Lucida Handwriting" panose="03010101010101010101" pitchFamily="66" charset="0"/>
                 </a:rPr>
-                <a:t>AI </a:t>
+                <a:t>AI 3.0 </a:t>
               </a:r>
               <a:r>
-                <a:rPr lang="en-US" sz="4200" smtClean="0">
-                  <a:solidFill>
-                    <a:srgbClr val="0039AC"/>
-                  </a:solidFill>
-                  <a:latin typeface="Lucida Handwriting" panose="03010101010101010101" pitchFamily="66" charset="0"/>
-                </a:rPr>
-                <a:t>3.0 </a:t>
-              </a:r>
-              <a:r>
-                <a:rPr lang="en-US" sz="3000" dirty="0" smtClean="0">
+                <a:rPr lang="en-US" sz="3000">
                   <a:solidFill>
                     <a:srgbClr val="0039AC"/>
                   </a:solidFill>
@@ -4674,12 +4759,6 @@
                 </a:rPr>
                 <a:t>(Philo)</a:t>
               </a:r>
-              <a:endParaRPr lang="en-US" sz="3000" dirty="0">
-                <a:solidFill>
-                  <a:srgbClr val="0039AC"/>
-                </a:solidFill>
-                <a:latin typeface="Lucida Handwriting" panose="03010101010101010101" pitchFamily="66" charset="0"/>
-              </a:endParaRPr>
             </a:p>
           </p:txBody>
         </p:sp>
@@ -4705,36 +4784,12 @@
             <a:lstStyle/>
             <a:p>
               <a:r>
-                <a:rPr lang="en-US" sz="1100" dirty="0" smtClean="0">
+                <a:rPr lang="en-US" sz="1100">
                   <a:solidFill>
                     <a:srgbClr val="0039AC"/>
                   </a:solidFill>
                 </a:rPr>
-                <a:t>                      Copyright </a:t>
-              </a:r>
-              <a:r>
-                <a:rPr lang="en-US" sz="1100" dirty="0">
-                  <a:solidFill>
-                    <a:srgbClr val="0039AC"/>
-                  </a:solidFill>
-                </a:rPr>
-                <a:t>© Coherent Knowledge Systems, LLC. </a:t>
-              </a:r>
-              <a:r>
-                <a:rPr lang="en-US" sz="1100" smtClean="0">
-                  <a:solidFill>
-                    <a:srgbClr val="0039AC"/>
-                  </a:solidFill>
-                </a:rPr>
-                <a:t>2013-2023.</a:t>
-              </a:r>
-              <a:r>
-                <a:rPr lang="en-US" sz="1100" dirty="0">
-                  <a:solidFill>
-                    <a:srgbClr val="0039AC"/>
-                  </a:solidFill>
-                </a:rPr>
-                <a:t> </a:t>
+                <a:t>                      Copyright © Coherent Knowledge Systems, LLC. 2013-2023. </a:t>
               </a:r>
             </a:p>
           </p:txBody>
@@ -4754,7 +4809,7 @@
           <a:blip r:embed="rId6" cstate="print">
             <a:extLst>
               <a:ext uri="{28A0092B-C50C-407E-A947-70E740481C1C}">
-                <a14:useLocalDpi xmlns="" xmlns:a14="http://schemas.microsoft.com/office/drawing/2010/main" val="0"/>
+                <a14:useLocalDpi xmlns:a14="http://schemas.microsoft.com/office/drawing/2010/main" val="0"/>
               </a:ext>
             </a:extLst>
           </a:blip>
@@ -4775,7 +4830,7 @@
     </p:spTree>
     <p:extLst>
       <p:ext uri="{BB962C8B-B14F-4D97-AF65-F5344CB8AC3E}">
-        <p14:creationId xmlns="" xmlns:p14="http://schemas.microsoft.com/office/powerpoint/2010/main" val="91026351"/>
+        <p14:creationId xmlns:p14="http://schemas.microsoft.com/office/powerpoint/2010/main" val="81185227"/>
       </p:ext>
     </p:extLst>
   </p:cSld>
@@ -4810,7 +4865,7 @@
         </p:nvGrpSpPr>
         <p:grpSpPr>
           <a:xfrm>
-            <a:off x="-259786" y="2"/>
+            <a:off x="-409397" y="0"/>
             <a:ext cx="7175322" cy="3008810"/>
             <a:chOff x="44963" y="1561290"/>
             <a:chExt cx="8727563" cy="4178097"/>
@@ -4895,7 +4950,7 @@
             <a:blip r:embed="rId3" cstate="email">
               <a:extLst>
                 <a:ext uri="{BEBA8EAE-BF5A-486C-A8C5-ECC9F3942E4B}">
-                  <a14:imgProps xmlns="" xmlns:a14="http://schemas.microsoft.com/office/drawing/2010/main">
+                  <a14:imgProps xmlns:a14="http://schemas.microsoft.com/office/drawing/2010/main">
                     <a14:imgLayer r:embed="rId4">
                       <a14:imgEffect>
                         <a14:artisticGlowDiffused/>
@@ -4904,7 +4959,7 @@
                   </a14:imgProps>
                 </a:ext>
                 <a:ext uri="{28A0092B-C50C-407E-A947-70E740481C1C}">
-                  <a14:useLocalDpi xmlns="" xmlns:a14="http://schemas.microsoft.com/office/drawing/2010/main"/>
+                  <a14:useLocalDpi xmlns:a14="http://schemas.microsoft.com/office/drawing/2010/main"/>
                 </a:ext>
               </a:extLst>
             </a:blip>
@@ -4930,7 +4985,7 @@
           <p:spPr>
             <a:xfrm>
               <a:off x="1695217" y="1963597"/>
-              <a:ext cx="6509232" cy="1068437"/>
+              <a:ext cx="6673276" cy="1068437"/>
             </a:xfrm>
             <a:prstGeom prst="rect">
               <a:avLst/>
@@ -4944,16 +4999,16 @@
             <a:lstStyle/>
             <a:p>
               <a:r>
-                <a:rPr lang="en-US" sz="4400" dirty="0">
+                <a:rPr lang="en-US" sz="4400">
                   <a:solidFill>
                     <a:srgbClr val="0039AC"/>
                   </a:solidFill>
                   <a:latin typeface="Lucida Handwriting" panose="03010101010101010101" pitchFamily="66" charset="0"/>
                 </a:rPr>
-                <a:t>E</a:t>
+                <a:t> E</a:t>
               </a:r>
               <a:r>
-                <a:rPr lang="en-US" sz="3400" dirty="0">
+                <a:rPr lang="en-US" sz="3400">
                   <a:solidFill>
                     <a:srgbClr val="0039AC"/>
                   </a:solidFill>
@@ -4962,58 +5017,22 @@
                 <a:t>RGO</a:t>
               </a:r>
               <a:r>
-                <a:rPr lang="en-US" sz="4200" dirty="0">
+                <a:rPr lang="en-US" sz="4200">
                   <a:solidFill>
                     <a:srgbClr val="0039AC"/>
                   </a:solidFill>
                   <a:latin typeface="Lucida Handwriting" panose="03010101010101010101" pitchFamily="66" charset="0"/>
                 </a:rPr>
-                <a:t>AI </a:t>
+                <a:t>AI 3.0 </a:t>
               </a:r>
               <a:r>
-                <a:rPr lang="en-US" sz="4400" dirty="0">
+                <a:rPr lang="en-US" sz="3000">
                   <a:solidFill>
                     <a:srgbClr val="0039AC"/>
                   </a:solidFill>
                   <a:latin typeface="Lucida Handwriting" panose="03010101010101010101" pitchFamily="66" charset="0"/>
                 </a:rPr>
-                <a:t>2.0</a:t>
-              </a:r>
-              <a:r>
-                <a:rPr lang="en-US" sz="4200" dirty="0">
-                  <a:solidFill>
-                    <a:srgbClr val="0039AC"/>
-                  </a:solidFill>
-                  <a:latin typeface="Lucida Handwriting" panose="03010101010101010101" pitchFamily="66" charset="0"/>
-                </a:rPr>
-                <a:t> </a:t>
-              </a:r>
-              <a:r>
-                <a:rPr lang="en-US" sz="3000" dirty="0">
-                  <a:solidFill>
-                    <a:srgbClr val="0039AC"/>
-                  </a:solidFill>
-                  <a:latin typeface="Lucida Handwriting" panose="03010101010101010101" pitchFamily="66" charset="0"/>
-                </a:rPr>
-                <a:t>(</a:t>
-              </a:r>
-              <a:r>
-                <a:rPr lang="en-US" sz="3000" dirty="0" err="1">
-                  <a:solidFill>
-                    <a:srgbClr val="0039AC"/>
-                  </a:solidFill>
-                  <a:latin typeface="Lucida Handwriting" panose="03010101010101010101" pitchFamily="66" charset="0"/>
-                </a:rPr>
-                <a:t>Myia</a:t>
-              </a:r>
-              <a:r>
-                <a:rPr lang="en-US" sz="3000" dirty="0">
-                  <a:solidFill>
-                    <a:srgbClr val="0039AC"/>
-                  </a:solidFill>
-                  <a:latin typeface="Lucida Handwriting" panose="03010101010101010101" pitchFamily="66" charset="0"/>
-                </a:rPr>
-                <a:t>)</a:t>
+                <a:t>(Philo)</a:t>
               </a:r>
             </a:p>
           </p:txBody>
@@ -5034,18 +5053,18 @@
             </a:prstGeom>
           </p:spPr>
           <p:txBody>
-            <a:bodyPr wrap="square" lIns="91422" tIns="45711" rIns="91422" bIns="45711">
+            <a:bodyPr wrap="square" lIns="91422" tIns="45711" rIns="91422" bIns="45711" anchor="t">
               <a:spAutoFit/>
             </a:bodyPr>
             <a:lstStyle/>
             <a:p>
               <a:r>
-                <a:rPr lang="en-US" sz="1100" dirty="0">
+                <a:rPr lang="en-US" sz="1100">
                   <a:solidFill>
                     <a:srgbClr val="0039AC"/>
                   </a:solidFill>
                 </a:rPr>
-                <a:t>Copyright © Coherent Knowledge Systems, LLC. 2013-2018.  All rights reserved.</a:t>
+                <a:t>                      Copyright © Coherent Knowledge Systems, LLC. 2013-2023. </a:t>
               </a:r>
             </a:p>
           </p:txBody>
@@ -5065,7 +5084,7 @@
           <a:blip r:embed="rId6" cstate="print">
             <a:extLst>
               <a:ext uri="{28A0092B-C50C-407E-A947-70E740481C1C}">
-                <a14:useLocalDpi xmlns="" xmlns:a14="http://schemas.microsoft.com/office/drawing/2010/main" val="0"/>
+                <a14:useLocalDpi xmlns:a14="http://schemas.microsoft.com/office/drawing/2010/main" val="0"/>
               </a:ext>
             </a:extLst>
           </a:blip>
@@ -5086,7 +5105,7 @@
     </p:spTree>
     <p:extLst>
       <p:ext uri="{BB962C8B-B14F-4D97-AF65-F5344CB8AC3E}">
-        <p14:creationId xmlns="" xmlns:p14="http://schemas.microsoft.com/office/powerpoint/2010/main" val="91026351"/>
+        <p14:creationId xmlns:p14="http://schemas.microsoft.com/office/powerpoint/2010/main" val="91026351"/>
       </p:ext>
     </p:extLst>
   </p:cSld>
@@ -5206,7 +5225,7 @@
             <a:blip r:embed="rId3" cstate="email">
               <a:extLst>
                 <a:ext uri="{BEBA8EAE-BF5A-486C-A8C5-ECC9F3942E4B}">
-                  <a14:imgProps xmlns="" xmlns:a14="http://schemas.microsoft.com/office/drawing/2010/main">
+                  <a14:imgProps xmlns:a14="http://schemas.microsoft.com/office/drawing/2010/main">
                     <a14:imgLayer r:embed="rId4">
                       <a14:imgEffect>
                         <a14:artisticGlowDiffused/>
@@ -5215,7 +5234,318 @@
                   </a14:imgProps>
                 </a:ext>
                 <a:ext uri="{28A0092B-C50C-407E-A947-70E740481C1C}">
-                  <a14:useLocalDpi xmlns="" xmlns:a14="http://schemas.microsoft.com/office/drawing/2010/main"/>
+                  <a14:useLocalDpi xmlns:a14="http://schemas.microsoft.com/office/drawing/2010/main"/>
+                </a:ext>
+              </a:extLst>
+            </a:blip>
+            <a:srcRect/>
+            <a:stretch/>
+          </p:blipFill>
+          <p:spPr>
+            <a:xfrm rot="6285236" flipH="1">
+              <a:off x="2432186" y="-502506"/>
+              <a:ext cx="3854670" cy="8629115"/>
+            </a:xfrm>
+            <a:prstGeom prst="rect">
+              <a:avLst/>
+            </a:prstGeom>
+          </p:spPr>
+        </p:pic>
+        <p:sp>
+          <p:nvSpPr>
+            <p:cNvPr id="6" name="TextBox 5"/>
+            <p:cNvSpPr txBox="1"/>
+            <p:nvPr/>
+          </p:nvSpPr>
+          <p:spPr>
+            <a:xfrm>
+              <a:off x="1695217" y="1963597"/>
+              <a:ext cx="6509232" cy="1068437"/>
+            </a:xfrm>
+            <a:prstGeom prst="rect">
+              <a:avLst/>
+            </a:prstGeom>
+            <a:noFill/>
+          </p:spPr>
+          <p:txBody>
+            <a:bodyPr wrap="square" lIns="91422" tIns="45711" rIns="91422" bIns="45711" rtlCol="0">
+              <a:spAutoFit/>
+            </a:bodyPr>
+            <a:lstStyle/>
+            <a:p>
+              <a:r>
+                <a:rPr lang="en-US" sz="4400">
+                  <a:solidFill>
+                    <a:srgbClr val="0039AC"/>
+                  </a:solidFill>
+                  <a:latin typeface="Lucida Handwriting" panose="03010101010101010101" pitchFamily="66" charset="0"/>
+                </a:rPr>
+                <a:t>E</a:t>
+              </a:r>
+              <a:r>
+                <a:rPr lang="en-US" sz="3400">
+                  <a:solidFill>
+                    <a:srgbClr val="0039AC"/>
+                  </a:solidFill>
+                  <a:latin typeface="Lucida Handwriting" panose="03010101010101010101" pitchFamily="66" charset="0"/>
+                </a:rPr>
+                <a:t>RGO</a:t>
+              </a:r>
+              <a:r>
+                <a:rPr lang="en-US" sz="4200">
+                  <a:solidFill>
+                    <a:srgbClr val="0039AC"/>
+                  </a:solidFill>
+                  <a:latin typeface="Lucida Handwriting" panose="03010101010101010101" pitchFamily="66" charset="0"/>
+                </a:rPr>
+                <a:t>AI </a:t>
+              </a:r>
+              <a:r>
+                <a:rPr lang="en-US" sz="4400">
+                  <a:solidFill>
+                    <a:srgbClr val="0039AC"/>
+                  </a:solidFill>
+                  <a:latin typeface="Lucida Handwriting" panose="03010101010101010101" pitchFamily="66" charset="0"/>
+                </a:rPr>
+                <a:t>2.0</a:t>
+              </a:r>
+              <a:r>
+                <a:rPr lang="en-US" sz="4200">
+                  <a:solidFill>
+                    <a:srgbClr val="0039AC"/>
+                  </a:solidFill>
+                  <a:latin typeface="Lucida Handwriting" panose="03010101010101010101" pitchFamily="66" charset="0"/>
+                </a:rPr>
+                <a:t> </a:t>
+              </a:r>
+              <a:r>
+                <a:rPr lang="en-US" sz="3000">
+                  <a:solidFill>
+                    <a:srgbClr val="0039AC"/>
+                  </a:solidFill>
+                  <a:latin typeface="Lucida Handwriting" panose="03010101010101010101" pitchFamily="66" charset="0"/>
+                </a:rPr>
+                <a:t>(</a:t>
+              </a:r>
+              <a:r>
+                <a:rPr lang="en-US" sz="3000" err="1">
+                  <a:solidFill>
+                    <a:srgbClr val="0039AC"/>
+                  </a:solidFill>
+                  <a:latin typeface="Lucida Handwriting" panose="03010101010101010101" pitchFamily="66" charset="0"/>
+                </a:rPr>
+                <a:t>Myia</a:t>
+              </a:r>
+              <a:r>
+                <a:rPr lang="en-US" sz="3000">
+                  <a:solidFill>
+                    <a:srgbClr val="0039AC"/>
+                  </a:solidFill>
+                  <a:latin typeface="Lucida Handwriting" panose="03010101010101010101" pitchFamily="66" charset="0"/>
+                </a:rPr>
+                <a:t>)</a:t>
+              </a:r>
+            </a:p>
+          </p:txBody>
+        </p:sp>
+        <p:sp>
+          <p:nvSpPr>
+            <p:cNvPr id="10" name="Rectangle 9"/>
+            <p:cNvSpPr/>
+            <p:nvPr/>
+          </p:nvSpPr>
+          <p:spPr>
+            <a:xfrm>
+              <a:off x="1880586" y="3539528"/>
+              <a:ext cx="6828127" cy="363252"/>
+            </a:xfrm>
+            <a:prstGeom prst="rect">
+              <a:avLst/>
+            </a:prstGeom>
+          </p:spPr>
+          <p:txBody>
+            <a:bodyPr wrap="square" lIns="91422" tIns="45711" rIns="91422" bIns="45711">
+              <a:spAutoFit/>
+            </a:bodyPr>
+            <a:lstStyle/>
+            <a:p>
+              <a:r>
+                <a:rPr lang="en-US" sz="1100">
+                  <a:solidFill>
+                    <a:srgbClr val="0039AC"/>
+                  </a:solidFill>
+                </a:rPr>
+                <a:t>Copyright © Coherent Knowledge Systems, LLC. 2013-2018.  All rights reserved.</a:t>
+              </a:r>
+            </a:p>
+          </p:txBody>
+        </p:sp>
+      </p:grpSp>
+      <p:pic>
+        <p:nvPicPr>
+          <p:cNvPr id="12" name="Picture 11">
+            <a:hlinkClick r:id="rId5"/>
+          </p:cNvPr>
+          <p:cNvPicPr>
+            <a:picLocks noChangeAspect="1"/>
+          </p:cNvPicPr>
+          <p:nvPr/>
+        </p:nvPicPr>
+        <p:blipFill>
+          <a:blip r:embed="rId6" cstate="print">
+            <a:extLst>
+              <a:ext uri="{28A0092B-C50C-407E-A947-70E740481C1C}">
+                <a14:useLocalDpi xmlns:a14="http://schemas.microsoft.com/office/drawing/2010/main" val="0"/>
+              </a:ext>
+            </a:extLst>
+          </a:blip>
+          <a:stretch>
+            <a:fillRect/>
+          </a:stretch>
+        </p:blipFill>
+        <p:spPr>
+          <a:xfrm>
+            <a:off x="57629" y="94276"/>
+            <a:ext cx="827146" cy="464757"/>
+          </a:xfrm>
+          <a:prstGeom prst="rect">
+            <a:avLst/>
+          </a:prstGeom>
+        </p:spPr>
+      </p:pic>
+    </p:spTree>
+    <p:extLst>
+      <p:ext uri="{BB962C8B-B14F-4D97-AF65-F5344CB8AC3E}">
+        <p14:creationId xmlns:p14="http://schemas.microsoft.com/office/powerpoint/2010/main" val="91026351"/>
+      </p:ext>
+    </p:extLst>
+  </p:cSld>
+  <p:clrMapOvr>
+    <a:masterClrMapping/>
+  </p:clrMapOvr>
+</p:sld>
+</file>
+
+<file path=ppt/slides/slide6.xml><?xml version="1.0" encoding="utf-8"?>
+<p:sld xmlns:a="http://schemas.openxmlformats.org/drawingml/2006/main" xmlns:r="http://schemas.openxmlformats.org/officeDocument/2006/relationships" xmlns:p="http://schemas.openxmlformats.org/presentationml/2006/main">
+  <p:cSld>
+    <p:spTree>
+      <p:nvGrpSpPr>
+        <p:cNvPr id="1" name=""/>
+        <p:cNvGrpSpPr/>
+        <p:nvPr/>
+      </p:nvGrpSpPr>
+      <p:grpSpPr>
+        <a:xfrm>
+          <a:off x="0" y="0"/>
+          <a:ext cx="0" cy="0"/>
+          <a:chOff x="0" y="0"/>
+          <a:chExt cx="0" cy="0"/>
+        </a:xfrm>
+      </p:grpSpPr>
+      <p:grpSp>
+        <p:nvGrpSpPr>
+          <p:cNvPr id="2" name="Group 1"/>
+          <p:cNvGrpSpPr/>
+          <p:nvPr/>
+        </p:nvGrpSpPr>
+        <p:grpSpPr>
+          <a:xfrm>
+            <a:off x="-259786" y="2"/>
+            <a:ext cx="7175322" cy="3008810"/>
+            <a:chOff x="44963" y="1561290"/>
+            <a:chExt cx="8727563" cy="4178097"/>
+          </a:xfrm>
+        </p:grpSpPr>
+        <p:sp>
+          <p:nvSpPr>
+            <p:cNvPr id="3" name="Rectangle 2"/>
+            <p:cNvSpPr/>
+            <p:nvPr/>
+          </p:nvSpPr>
+          <p:spPr>
+            <a:xfrm>
+              <a:off x="276358" y="1561290"/>
+              <a:ext cx="8496168" cy="2324910"/>
+            </a:xfrm>
+            <a:prstGeom prst="rect">
+              <a:avLst/>
+            </a:prstGeom>
+            <a:gradFill flip="none" rotWithShape="1">
+              <a:gsLst>
+                <a:gs pos="0">
+                  <a:schemeClr val="accent1"/>
+                </a:gs>
+                <a:gs pos="53000">
+                  <a:schemeClr val="accent1">
+                    <a:lumMod val="20000"/>
+                    <a:lumOff val="80000"/>
+                  </a:schemeClr>
+                </a:gs>
+                <a:gs pos="83000">
+                  <a:schemeClr val="accent1">
+                    <a:lumMod val="20000"/>
+                    <a:lumOff val="80000"/>
+                  </a:schemeClr>
+                </a:gs>
+                <a:gs pos="100000">
+                  <a:schemeClr val="bg1"/>
+                </a:gs>
+              </a:gsLst>
+              <a:lin ang="18900000" scaled="1"/>
+              <a:tileRect/>
+            </a:gradFill>
+            <a:ln>
+              <a:noFill/>
+            </a:ln>
+          </p:spPr>
+          <p:style>
+            <a:lnRef idx="2">
+              <a:schemeClr val="accent1">
+                <a:shade val="50000"/>
+              </a:schemeClr>
+            </a:lnRef>
+            <a:fillRef idx="1">
+              <a:schemeClr val="accent1"/>
+            </a:fillRef>
+            <a:effectRef idx="0">
+              <a:schemeClr val="accent1"/>
+            </a:effectRef>
+            <a:fontRef idx="minor">
+              <a:schemeClr val="lt1"/>
+            </a:fontRef>
+          </p:style>
+          <p:txBody>
+            <a:bodyPr lIns="91422" tIns="45711" rIns="91422" bIns="45711" spcCol="0" rtlCol="0" anchor="ctr"/>
+            <a:lstStyle/>
+            <a:p>
+              <a:pPr algn="ctr"/>
+              <a:endParaRPr lang="en-US"/>
+            </a:p>
+          </p:txBody>
+        </p:sp>
+        <p:pic>
+          <p:nvPicPr>
+            <p:cNvPr id="4" name="Picture 3"/>
+            <p:cNvPicPr>
+              <a:picLocks noChangeAspect="1"/>
+            </p:cNvPicPr>
+            <p:nvPr/>
+          </p:nvPicPr>
+          <p:blipFill rotWithShape="1">
+            <a:blip r:embed="rId3" cstate="email">
+              <a:extLst>
+                <a:ext uri="{BEBA8EAE-BF5A-486C-A8C5-ECC9F3942E4B}">
+                  <a14:imgProps xmlns:a14="http://schemas.microsoft.com/office/drawing/2010/main">
+                    <a14:imgLayer r:embed="rId4">
+                      <a14:imgEffect>
+                        <a14:artisticGlowDiffused/>
+                      </a14:imgEffect>
+                    </a14:imgLayer>
+                  </a14:imgProps>
+                </a:ext>
+                <a:ext uri="{28A0092B-C50C-407E-A947-70E740481C1C}">
+                  <a14:useLocalDpi xmlns:a14="http://schemas.microsoft.com/office/drawing/2010/main"/>
                 </a:ext>
               </a:extLst>
             </a:blip>
@@ -5255,22 +5585,13 @@
             <a:lstStyle/>
             <a:p>
               <a:r>
-                <a:rPr lang="en-US" sz="4200" dirty="0">
-                  <a:solidFill>
-                    <a:srgbClr val="0039AC"/>
-                  </a:solidFill>
-                  <a:latin typeface="Lucida Handwriting" panose="03010101010101010101" pitchFamily="66" charset="0"/>
-                </a:rPr>
-                <a:t>ERGO </a:t>
-              </a:r>
-              <a:r>
                 <a:rPr lang="en-US" sz="4200">
                   <a:solidFill>
                     <a:srgbClr val="0039AC"/>
                   </a:solidFill>
                   <a:latin typeface="Lucida Handwriting" panose="03010101010101010101" pitchFamily="66" charset="0"/>
                 </a:rPr>
-                <a:t>1.3 </a:t>
+                <a:t>ERGO 1.3 </a:t>
               </a:r>
               <a:r>
                 <a:rPr lang="en-US" sz="3000">
@@ -5281,12 +5602,6 @@
                 </a:rPr>
                 <a:t>(Zeno)</a:t>
               </a:r>
-              <a:endParaRPr lang="en-US" sz="3000" dirty="0">
-                <a:solidFill>
-                  <a:srgbClr val="0039AC"/>
-                </a:solidFill>
-                <a:latin typeface="Lucida Handwriting" panose="03010101010101010101" pitchFamily="66" charset="0"/>
-              </a:endParaRPr>
             </a:p>
           </p:txBody>
         </p:sp>
@@ -5312,28 +5627,12 @@
             <a:lstStyle/>
             <a:p>
               <a:r>
-                <a:rPr lang="en-US" sz="1100" dirty="0">
-                  <a:solidFill>
-                    <a:srgbClr val="0039AC"/>
-                  </a:solidFill>
-                </a:rPr>
-                <a:t>Copyright © Coherent Knowledge Systems, LLC. </a:t>
-              </a:r>
-              <a:r>
                 <a:rPr lang="en-US" sz="1100">
                   <a:solidFill>
                     <a:srgbClr val="0039AC"/>
                   </a:solidFill>
                 </a:rPr>
-                <a:t>2013-2018.  </a:t>
-              </a:r>
-              <a:r>
-                <a:rPr lang="en-US" sz="1100" dirty="0">
-                  <a:solidFill>
-                    <a:srgbClr val="0039AC"/>
-                  </a:solidFill>
-                </a:rPr>
-                <a:t>All rights reserved.</a:t>
+                <a:t>Copyright © Coherent Knowledge Systems, LLC. 2013-2018.  All rights reserved.</a:t>
               </a:r>
             </a:p>
           </p:txBody>
@@ -5353,7 +5652,7 @@
           <a:blip r:embed="rId6" cstate="print">
             <a:extLst>
               <a:ext uri="{28A0092B-C50C-407E-A947-70E740481C1C}">
-                <a14:useLocalDpi xmlns="" xmlns:a14="http://schemas.microsoft.com/office/drawing/2010/main" val="0"/>
+                <a14:useLocalDpi xmlns:a14="http://schemas.microsoft.com/office/drawing/2010/main" val="0"/>
               </a:ext>
             </a:extLst>
           </a:blip>
@@ -5374,7 +5673,7 @@
     </p:spTree>
     <p:extLst>
       <p:ext uri="{BB962C8B-B14F-4D97-AF65-F5344CB8AC3E}">
-        <p14:creationId xmlns="" xmlns:p14="http://schemas.microsoft.com/office/powerpoint/2010/main" val="91026351"/>
+        <p14:creationId xmlns:p14="http://schemas.microsoft.com/office/powerpoint/2010/main" val="91026351"/>
       </p:ext>
     </p:extLst>
   </p:cSld>
@@ -5384,7 +5683,7 @@
 </p:sld>
 </file>
 
-<file path=ppt/slides/slide6.xml><?xml version="1.0" encoding="utf-8"?>
+<file path=ppt/slides/slide7.xml><?xml version="1.0" encoding="utf-8"?>
 <p:sld xmlns:a="http://schemas.openxmlformats.org/drawingml/2006/main" xmlns:r="http://schemas.openxmlformats.org/officeDocument/2006/relationships" xmlns:p="http://schemas.openxmlformats.org/presentationml/2006/main">
   <p:cSld>
     <p:spTree>
@@ -5494,7 +5793,7 @@
             <a:blip r:embed="rId3" cstate="email">
               <a:extLst>
                 <a:ext uri="{BEBA8EAE-BF5A-486C-A8C5-ECC9F3942E4B}">
-                  <a14:imgProps xmlns="" xmlns:a14="http://schemas.microsoft.com/office/drawing/2010/main">
+                  <a14:imgProps xmlns:a14="http://schemas.microsoft.com/office/drawing/2010/main">
                     <a14:imgLayer r:embed="rId4">
                       <a14:imgEffect>
                         <a14:artisticGlowDiffused/>
@@ -5503,7 +5802,7 @@
                   </a14:imgProps>
                 </a:ext>
                 <a:ext uri="{28A0092B-C50C-407E-A947-70E740481C1C}">
-                  <a14:useLocalDpi xmlns="" xmlns:a14="http://schemas.microsoft.com/office/drawing/2010/main"/>
+                  <a14:useLocalDpi xmlns:a14="http://schemas.microsoft.com/office/drawing/2010/main"/>
                 </a:ext>
               </a:extLst>
             </a:blip>
@@ -5543,7 +5842,7 @@
             <a:lstStyle/>
             <a:p>
               <a:r>
-                <a:rPr lang="en-US" sz="4200" dirty="0">
+                <a:rPr lang="en-US" sz="4200">
                   <a:solidFill>
                     <a:srgbClr val="0039AC"/>
                   </a:solidFill>
@@ -5552,7 +5851,7 @@
                 <a:t>ERGO 1.2</a:t>
               </a:r>
               <a:r>
-                <a:rPr lang="en-US" sz="3000" dirty="0">
+                <a:rPr lang="en-US" sz="3000">
                   <a:solidFill>
                     <a:srgbClr val="0039AC"/>
                   </a:solidFill>
@@ -5585,7 +5884,7 @@
             <a:lstStyle/>
             <a:p>
               <a:r>
-                <a:rPr lang="en-US" sz="1100" dirty="0">
+                <a:rPr lang="en-US" sz="1100">
                   <a:solidFill>
                     <a:srgbClr val="0039AC"/>
                   </a:solidFill>
@@ -5610,7 +5909,7 @@
           <a:blip r:embed="rId6" cstate="print">
             <a:extLst>
               <a:ext uri="{28A0092B-C50C-407E-A947-70E740481C1C}">
-                <a14:useLocalDpi xmlns="" xmlns:a14="http://schemas.microsoft.com/office/drawing/2010/main" val="0"/>
+                <a14:useLocalDpi xmlns:a14="http://schemas.microsoft.com/office/drawing/2010/main" val="0"/>
               </a:ext>
             </a:extLst>
           </a:blip>
@@ -5631,7 +5930,7 @@
     </p:spTree>
     <p:extLst>
       <p:ext uri="{BB962C8B-B14F-4D97-AF65-F5344CB8AC3E}">
-        <p14:creationId xmlns="" xmlns:p14="http://schemas.microsoft.com/office/powerpoint/2010/main" val="91026351"/>
+        <p14:creationId xmlns:p14="http://schemas.microsoft.com/office/powerpoint/2010/main" val="91026351"/>
       </p:ext>
     </p:extLst>
   </p:cSld>
@@ -5641,7 +5940,7 @@
 </p:sld>
 </file>
 
-<file path=ppt/slides/slide7.xml><?xml version="1.0" encoding="utf-8"?>
+<file path=ppt/slides/slide8.xml><?xml version="1.0" encoding="utf-8"?>
 <p:sld xmlns:a="http://schemas.openxmlformats.org/drawingml/2006/main" xmlns:r="http://schemas.openxmlformats.org/officeDocument/2006/relationships" xmlns:p="http://schemas.openxmlformats.org/presentationml/2006/main">
   <p:cSld>
     <p:spTree>
@@ -5762,7 +6061,7 @@
             <a:lstStyle/>
             <a:p>
               <a:r>
-                <a:rPr lang="en-US" sz="2800" dirty="0" err="1" smtClean="0">
+                <a:rPr lang="en-US" sz="2800" err="1">
                   <a:solidFill>
                     <a:srgbClr val="0039AC"/>
                   </a:solidFill>
@@ -5770,7 +6069,7 @@
                 </a:rPr>
                 <a:t>ErgoAI</a:t>
               </a:r>
-              <a:endParaRPr lang="en-US" sz="2800" dirty="0">
+              <a:endParaRPr lang="en-US" sz="2800">
                 <a:solidFill>
                   <a:srgbClr val="0039AC"/>
                 </a:solidFill>
@@ -5783,7 +6082,7 @@
     </p:spTree>
     <p:extLst>
       <p:ext uri="{BB962C8B-B14F-4D97-AF65-F5344CB8AC3E}">
-        <p14:creationId xmlns="" xmlns:p14="http://schemas.microsoft.com/office/powerpoint/2010/main" val="91026351"/>
+        <p14:creationId xmlns:p14="http://schemas.microsoft.com/office/powerpoint/2010/main" val="91026351"/>
       </p:ext>
     </p:extLst>
   </p:cSld>

</xml_diff>